<commit_message>
all the lore and good ending
</commit_message>
<xml_diff>
--- a/Gun Run Presentation.pptx
+++ b/Gun Run Presentation.pptx
@@ -108,6 +108,11 @@
       </a:defRPr>
     </a:lvl9pPr>
   </p:defaultTextStyle>
+  <p:extLst>
+    <p:ext uri="{EFAFB233-063F-42B5-8137-9DF3F51BA10A}">
+      <p15:sldGuideLst xmlns:p15="http://schemas.microsoft.com/office/powerpoint/2012/main"/>
+    </p:ext>
+  </p:extLst>
 </p:presentation>
 </file>
 
@@ -124,22 +129,30 @@
   <pc:docChgLst>
     <pc:chgData name="Zorrilla, Cesar '24" userId="d7064e4d-c079-4c36-afb4-977bcecb02e6" providerId="ADAL" clId="{098C63C8-8B25-4C0A-B8B8-9962D11DED22}"/>
     <pc:docChg chg="addSld modSld">
-      <pc:chgData name="Zorrilla, Cesar '24" userId="d7064e4d-c079-4c36-afb4-977bcecb02e6" providerId="ADAL" clId="{098C63C8-8B25-4C0A-B8B8-9962D11DED22}" dt="2023-05-10T16:09:58.594" v="46"/>
+      <pc:chgData name="Zorrilla, Cesar '24" userId="d7064e4d-c079-4c36-afb4-977bcecb02e6" providerId="ADAL" clId="{098C63C8-8B25-4C0A-B8B8-9962D11DED22}" dt="2023-05-12T20:23:31.878" v="147" actId="20577"/>
       <pc:docMkLst>
         <pc:docMk/>
       </pc:docMkLst>
       <pc:sldChg chg="modSp mod">
-        <pc:chgData name="Zorrilla, Cesar '24" userId="d7064e4d-c079-4c36-afb4-977bcecb02e6" providerId="ADAL" clId="{098C63C8-8B25-4C0A-B8B8-9962D11DED22}" dt="2023-05-10T16:07:08.296" v="4" actId="20577"/>
+        <pc:chgData name="Zorrilla, Cesar '24" userId="d7064e4d-c079-4c36-afb4-977bcecb02e6" providerId="ADAL" clId="{098C63C8-8B25-4C0A-B8B8-9962D11DED22}" dt="2023-05-12T20:23:31.878" v="147" actId="20577"/>
         <pc:sldMkLst>
           <pc:docMk/>
           <pc:sldMk cId="1925557711" sldId="256"/>
         </pc:sldMkLst>
         <pc:spChg chg="mod">
-          <ac:chgData name="Zorrilla, Cesar '24" userId="d7064e4d-c079-4c36-afb4-977bcecb02e6" providerId="ADAL" clId="{098C63C8-8B25-4C0A-B8B8-9962D11DED22}" dt="2023-05-10T16:07:08.296" v="4" actId="20577"/>
+          <ac:chgData name="Zorrilla, Cesar '24" userId="d7064e4d-c079-4c36-afb4-977bcecb02e6" providerId="ADAL" clId="{098C63C8-8B25-4C0A-B8B8-9962D11DED22}" dt="2023-05-12T20:23:16.561" v="113" actId="20577"/>
           <ac:spMkLst>
             <pc:docMk/>
             <pc:sldMk cId="1925557711" sldId="256"/>
             <ac:spMk id="2" creationId="{429B54D9-3034-A49E-8E7A-AF2C00D14B60}"/>
+          </ac:spMkLst>
+        </pc:spChg>
+        <pc:spChg chg="mod">
+          <ac:chgData name="Zorrilla, Cesar '24" userId="d7064e4d-c079-4c36-afb4-977bcecb02e6" providerId="ADAL" clId="{098C63C8-8B25-4C0A-B8B8-9962D11DED22}" dt="2023-05-12T20:23:31.878" v="147" actId="20577"/>
+          <ac:spMkLst>
+            <pc:docMk/>
+            <pc:sldMk cId="1925557711" sldId="256"/>
+            <ac:spMk id="3" creationId="{B2430A27-61FD-B0D0-B061-1AC074DDEF61}"/>
           </ac:spMkLst>
         </pc:spChg>
       </pc:sldChg>
@@ -159,13 +172,13 @@
         </pc:spChg>
       </pc:sldChg>
       <pc:sldChg chg="modSp new mod">
-        <pc:chgData name="Zorrilla, Cesar '24" userId="d7064e4d-c079-4c36-afb4-977bcecb02e6" providerId="ADAL" clId="{098C63C8-8B25-4C0A-B8B8-9962D11DED22}" dt="2023-05-10T16:09:52.574" v="44" actId="20577"/>
+        <pc:chgData name="Zorrilla, Cesar '24" userId="d7064e4d-c079-4c36-afb4-977bcecb02e6" providerId="ADAL" clId="{098C63C8-8B25-4C0A-B8B8-9962D11DED22}" dt="2023-05-12T19:55:56.730" v="59" actId="20577"/>
         <pc:sldMkLst>
           <pc:docMk/>
           <pc:sldMk cId="513826829" sldId="258"/>
         </pc:sldMkLst>
         <pc:spChg chg="mod">
-          <ac:chgData name="Zorrilla, Cesar '24" userId="d7064e4d-c079-4c36-afb4-977bcecb02e6" providerId="ADAL" clId="{098C63C8-8B25-4C0A-B8B8-9962D11DED22}" dt="2023-05-10T16:09:52.574" v="44" actId="20577"/>
+          <ac:chgData name="Zorrilla, Cesar '24" userId="d7064e4d-c079-4c36-afb4-977bcecb02e6" providerId="ADAL" clId="{098C63C8-8B25-4C0A-B8B8-9962D11DED22}" dt="2023-05-12T19:55:56.730" v="59" actId="20577"/>
           <ac:spMkLst>
             <pc:docMk/>
             <pc:sldMk cId="513826829" sldId="258"/>
@@ -339,7 +352,7 @@
           <a:p>
             <a:fld id="{6C18980B-3844-4793-A027-B4AFC75AC102}" type="datetimeFigureOut">
               <a:rPr lang="en-US" smtClean="0"/>
-              <a:t>5/10/2023</a:t>
+              <a:t>5/12/2023</a:t>
             </a:fld>
             <a:endParaRPr lang="en-US"/>
           </a:p>
@@ -537,7 +550,7 @@
           <a:p>
             <a:fld id="{6C18980B-3844-4793-A027-B4AFC75AC102}" type="datetimeFigureOut">
               <a:rPr lang="en-US" smtClean="0"/>
-              <a:t>5/10/2023</a:t>
+              <a:t>5/12/2023</a:t>
             </a:fld>
             <a:endParaRPr lang="en-US"/>
           </a:p>
@@ -745,7 +758,7 @@
           <a:p>
             <a:fld id="{6C18980B-3844-4793-A027-B4AFC75AC102}" type="datetimeFigureOut">
               <a:rPr lang="en-US" smtClean="0"/>
-              <a:t>5/10/2023</a:t>
+              <a:t>5/12/2023</a:t>
             </a:fld>
             <a:endParaRPr lang="en-US"/>
           </a:p>
@@ -943,7 +956,7 @@
           <a:p>
             <a:fld id="{6C18980B-3844-4793-A027-B4AFC75AC102}" type="datetimeFigureOut">
               <a:rPr lang="en-US" smtClean="0"/>
-              <a:t>5/10/2023</a:t>
+              <a:t>5/12/2023</a:t>
             </a:fld>
             <a:endParaRPr lang="en-US"/>
           </a:p>
@@ -1218,7 +1231,7 @@
           <a:p>
             <a:fld id="{6C18980B-3844-4793-A027-B4AFC75AC102}" type="datetimeFigureOut">
               <a:rPr lang="en-US" smtClean="0"/>
-              <a:t>5/10/2023</a:t>
+              <a:t>5/12/2023</a:t>
             </a:fld>
             <a:endParaRPr lang="en-US"/>
           </a:p>
@@ -1483,7 +1496,7 @@
           <a:p>
             <a:fld id="{6C18980B-3844-4793-A027-B4AFC75AC102}" type="datetimeFigureOut">
               <a:rPr lang="en-US" smtClean="0"/>
-              <a:t>5/10/2023</a:t>
+              <a:t>5/12/2023</a:t>
             </a:fld>
             <a:endParaRPr lang="en-US"/>
           </a:p>
@@ -1895,7 +1908,7 @@
           <a:p>
             <a:fld id="{6C18980B-3844-4793-A027-B4AFC75AC102}" type="datetimeFigureOut">
               <a:rPr lang="en-US" smtClean="0"/>
-              <a:t>5/10/2023</a:t>
+              <a:t>5/12/2023</a:t>
             </a:fld>
             <a:endParaRPr lang="en-US"/>
           </a:p>
@@ -2036,7 +2049,7 @@
           <a:p>
             <a:fld id="{6C18980B-3844-4793-A027-B4AFC75AC102}" type="datetimeFigureOut">
               <a:rPr lang="en-US" smtClean="0"/>
-              <a:t>5/10/2023</a:t>
+              <a:t>5/12/2023</a:t>
             </a:fld>
             <a:endParaRPr lang="en-US"/>
           </a:p>
@@ -2149,7 +2162,7 @@
           <a:p>
             <a:fld id="{6C18980B-3844-4793-A027-B4AFC75AC102}" type="datetimeFigureOut">
               <a:rPr lang="en-US" smtClean="0"/>
-              <a:t>5/10/2023</a:t>
+              <a:t>5/12/2023</a:t>
             </a:fld>
             <a:endParaRPr lang="en-US"/>
           </a:p>
@@ -2460,7 +2473,7 @@
           <a:p>
             <a:fld id="{6C18980B-3844-4793-A027-B4AFC75AC102}" type="datetimeFigureOut">
               <a:rPr lang="en-US" smtClean="0"/>
-              <a:t>5/10/2023</a:t>
+              <a:t>5/12/2023</a:t>
             </a:fld>
             <a:endParaRPr lang="en-US"/>
           </a:p>
@@ -2748,7 +2761,7 @@
           <a:p>
             <a:fld id="{6C18980B-3844-4793-A027-B4AFC75AC102}" type="datetimeFigureOut">
               <a:rPr lang="en-US" smtClean="0"/>
-              <a:t>5/10/2023</a:t>
+              <a:t>5/12/2023</a:t>
             </a:fld>
             <a:endParaRPr lang="en-US"/>
           </a:p>
@@ -2989,7 +3002,7 @@
           <a:p>
             <a:fld id="{6C18980B-3844-4793-A027-B4AFC75AC102}" type="datetimeFigureOut">
               <a:rPr lang="en-US" smtClean="0"/>
-              <a:t>5/10/2023</a:t>
+              <a:t>5/12/2023</a:t>
             </a:fld>
             <a:endParaRPr lang="en-US"/>
           </a:p>
@@ -3429,7 +3442,7 @@
           <a:p>
             <a:r>
               <a:rPr lang="en-US" dirty="0"/>
-              <a:t>Title</a:t>
+              <a:t>Geometry Wars</a:t>
             </a:r>
           </a:p>
         </p:txBody>
@@ -3455,7 +3468,10 @@
           <a:bodyPr/>
           <a:lstStyle/>
           <a:p>
-            <a:endParaRPr lang="en-US"/>
+            <a:r>
+              <a:rPr lang="en-US" dirty="0"/>
+              <a:t>Game by Jaime Cesar Zorrilla</a:t>
+            </a:r>
           </a:p>
         </p:txBody>
       </p:sp>
@@ -3595,7 +3611,7 @@
           <a:p>
             <a:r>
               <a:rPr lang="en-US" dirty="0"/>
-              <a:t>Code</a:t>
+              <a:t>Process</a:t>
             </a:r>
           </a:p>
         </p:txBody>

</xml_diff>

<commit_message>
Clean up of unused code
</commit_message>
<xml_diff>
--- a/Gun Run Presentation.pptx
+++ b/Gun Run Presentation.pptx
@@ -7,8 +7,8 @@
   <p:sldIdLst>
     <p:sldId id="256" r:id="rId2"/>
     <p:sldId id="257" r:id="rId3"/>
-    <p:sldId id="258" r:id="rId4"/>
-    <p:sldId id="259" r:id="rId5"/>
+    <p:sldId id="259" r:id="rId4"/>
+    <p:sldId id="258" r:id="rId5"/>
     <p:sldId id="260" r:id="rId6"/>
   </p:sldIdLst>
   <p:sldSz cx="12192000" cy="6858000"/>
@@ -128,19 +128,19 @@
 <pc:chgInfo xmlns:a="http://schemas.openxmlformats.org/drawingml/2006/main" xmlns:r="http://schemas.openxmlformats.org/officeDocument/2006/relationships" xmlns:ac="http://schemas.microsoft.com/office/drawing/2013/main/command" xmlns:pc="http://schemas.microsoft.com/office/powerpoint/2013/main/command">
   <pc:docChgLst>
     <pc:chgData name="Zorrilla, Cesar '24" userId="d7064e4d-c079-4c36-afb4-977bcecb02e6" providerId="ADAL" clId="{098C63C8-8B25-4C0A-B8B8-9962D11DED22}"/>
-    <pc:docChg chg="undo custSel addSld modSld">
-      <pc:chgData name="Zorrilla, Cesar '24" userId="d7064e4d-c079-4c36-afb4-977bcecb02e6" providerId="ADAL" clId="{098C63C8-8B25-4C0A-B8B8-9962D11DED22}" dt="2023-05-16T17:59:41.719" v="412" actId="20577"/>
+    <pc:docChg chg="undo custSel addSld modSld sldOrd">
+      <pc:chgData name="Zorrilla, Cesar '24" userId="d7064e4d-c079-4c36-afb4-977bcecb02e6" providerId="ADAL" clId="{098C63C8-8B25-4C0A-B8B8-9962D11DED22}" dt="2023-05-16T18:16:13.982" v="663"/>
       <pc:docMkLst>
         <pc:docMk/>
       </pc:docMkLst>
       <pc:sldChg chg="addSp delSp modSp mod setBg addAnim delAnim setClrOvrMap">
-        <pc:chgData name="Zorrilla, Cesar '24" userId="d7064e4d-c079-4c36-afb4-977bcecb02e6" providerId="ADAL" clId="{098C63C8-8B25-4C0A-B8B8-9962D11DED22}" dt="2023-05-16T14:43:16.849" v="157" actId="26606"/>
+        <pc:chgData name="Zorrilla, Cesar '24" userId="d7064e4d-c079-4c36-afb4-977bcecb02e6" providerId="ADAL" clId="{098C63C8-8B25-4C0A-B8B8-9962D11DED22}" dt="2023-05-16T18:01:53.489" v="432" actId="20577"/>
         <pc:sldMkLst>
           <pc:docMk/>
           <pc:sldMk cId="1925557711" sldId="256"/>
         </pc:sldMkLst>
         <pc:spChg chg="mod">
-          <ac:chgData name="Zorrilla, Cesar '24" userId="d7064e4d-c079-4c36-afb4-977bcecb02e6" providerId="ADAL" clId="{098C63C8-8B25-4C0A-B8B8-9962D11DED22}" dt="2023-05-16T14:43:16.849" v="157" actId="26606"/>
+          <ac:chgData name="Zorrilla, Cesar '24" userId="d7064e4d-c079-4c36-afb4-977bcecb02e6" providerId="ADAL" clId="{098C63C8-8B25-4C0A-B8B8-9962D11DED22}" dt="2023-05-16T18:01:53.489" v="432" actId="20577"/>
           <ac:spMkLst>
             <pc:docMk/>
             <pc:sldMk cId="1925557711" sldId="256"/>
@@ -205,7 +205,7 @@
         </pc:picChg>
       </pc:sldChg>
       <pc:sldChg chg="addSp delSp modSp new mod">
-        <pc:chgData name="Zorrilla, Cesar '24" userId="d7064e4d-c079-4c36-afb4-977bcecb02e6" providerId="ADAL" clId="{098C63C8-8B25-4C0A-B8B8-9962D11DED22}" dt="2023-05-16T17:59:41.719" v="412" actId="20577"/>
+        <pc:chgData name="Zorrilla, Cesar '24" userId="d7064e4d-c079-4c36-afb4-977bcecb02e6" providerId="ADAL" clId="{098C63C8-8B25-4C0A-B8B8-9962D11DED22}" dt="2023-05-16T18:16:07.707" v="661" actId="20577"/>
         <pc:sldMkLst>
           <pc:docMk/>
           <pc:sldMk cId="3172025758" sldId="257"/>
@@ -219,7 +219,7 @@
           </ac:spMkLst>
         </pc:spChg>
         <pc:spChg chg="mod">
-          <ac:chgData name="Zorrilla, Cesar '24" userId="d7064e4d-c079-4c36-afb4-977bcecb02e6" providerId="ADAL" clId="{098C63C8-8B25-4C0A-B8B8-9962D11DED22}" dt="2023-05-16T17:59:41.719" v="412" actId="20577"/>
+          <ac:chgData name="Zorrilla, Cesar '24" userId="d7064e4d-c079-4c36-afb4-977bcecb02e6" providerId="ADAL" clId="{098C63C8-8B25-4C0A-B8B8-9962D11DED22}" dt="2023-05-16T18:16:07.707" v="661" actId="20577"/>
           <ac:spMkLst>
             <pc:docMk/>
             <pc:sldMk cId="3172025758" sldId="257"/>
@@ -250,8 +250,8 @@
           </ac:spMkLst>
         </pc:spChg>
       </pc:sldChg>
-      <pc:sldChg chg="modSp add mod">
-        <pc:chgData name="Zorrilla, Cesar '24" userId="d7064e4d-c079-4c36-afb4-977bcecb02e6" providerId="ADAL" clId="{098C63C8-8B25-4C0A-B8B8-9962D11DED22}" dt="2023-05-16T17:53:43.943" v="283" actId="20577"/>
+      <pc:sldChg chg="modSp add mod ord">
+        <pc:chgData name="Zorrilla, Cesar '24" userId="d7064e4d-c079-4c36-afb4-977bcecb02e6" providerId="ADAL" clId="{098C63C8-8B25-4C0A-B8B8-9962D11DED22}" dt="2023-05-16T18:16:13.982" v="663"/>
         <pc:sldMkLst>
           <pc:docMk/>
           <pc:sldMk cId="2649230545" sldId="259"/>
@@ -3589,8 +3589,8 @@
           <a:p>
             <a:pPr algn="l"/>
             <a:r>
-              <a:rPr lang="en-US" sz="6100"/>
-              <a:t>Geometry Wars</a:t>
+              <a:rPr lang="en-US" sz="6100" dirty="0"/>
+              <a:t>Gun Run</a:t>
             </a:r>
           </a:p>
         </p:txBody>
@@ -4018,13 +4018,8 @@
             </a:pPr>
             <a:r>
               <a:rPr lang="en-US" dirty="0"/>
-              <a:t>The goal was to create a game with a focus on challenging gameplay and interesting lore. Under this, the </a:t>
-            </a:r>
-            <a:r>
-              <a:rPr lang="en-US"/>
-              <a:t>specific goals were</a:t>
-            </a:r>
-            <a:endParaRPr lang="en-US" dirty="0"/>
+              <a:t>The goal was to create a game with a focus on challenging gameplay and interesting lore. Under this, the specific goals were adding a timer, adding visual feedback for player health, a respawn mechanic for when a player falls of the world, a bullet mob, on screen text, and randomized platforms. I met all goals but the last one.</a:t>
+            </a:r>
           </a:p>
           <a:p>
             <a:pPr marL="0" indent="0" algn="ctr">
@@ -4096,7 +4091,7 @@
           <a:p>
             <a:r>
               <a:rPr lang="en-US" dirty="0"/>
-              <a:t>Process</a:t>
+              <a:t>Problem &amp; future</a:t>
             </a:r>
           </a:p>
         </p:txBody>
@@ -4129,7 +4124,7 @@
     </p:spTree>
     <p:extLst>
       <p:ext uri="{BB962C8B-B14F-4D97-AF65-F5344CB8AC3E}">
-        <p14:creationId xmlns:p14="http://schemas.microsoft.com/office/powerpoint/2010/main" val="513826829"/>
+        <p14:creationId xmlns:p14="http://schemas.microsoft.com/office/powerpoint/2010/main" val="2649230545"/>
       </p:ext>
     </p:extLst>
   </p:cSld>
@@ -4179,7 +4174,7 @@
           <a:p>
             <a:r>
               <a:rPr lang="en-US" dirty="0"/>
-              <a:t>Problem &amp; future</a:t>
+              <a:t>Process</a:t>
             </a:r>
           </a:p>
         </p:txBody>
@@ -4212,7 +4207,7 @@
     </p:spTree>
     <p:extLst>
       <p:ext uri="{BB962C8B-B14F-4D97-AF65-F5344CB8AC3E}">
-        <p14:creationId xmlns:p14="http://schemas.microsoft.com/office/powerpoint/2010/main" val="2649230545"/>
+        <p14:creationId xmlns:p14="http://schemas.microsoft.com/office/powerpoint/2010/main" val="513826829"/>
       </p:ext>
     </p:extLst>
   </p:cSld>

</xml_diff>